<commit_message>
Adding Rmd results, metadata, README
Added Rmd file with results and figures. Also added metadata description of data used in analysis and a README file that describes file structure.
</commit_message>
<xml_diff>
--- a/Final_figures/Legend.pptx
+++ b/Final_figures/Legend.pptx
@@ -3016,7 +3016,7 @@
             <a:prstGeom prst="line">
               <a:avLst/>
             </a:prstGeom>
-            <a:ln w="152400">
+            <a:ln w="254000">
               <a:solidFill>
                 <a:srgbClr val="C6C6C6"/>
               </a:solidFill>
@@ -3189,11 +3189,11 @@
           <a:prstGeom prst="line">
             <a:avLst/>
           </a:prstGeom>
-          <a:ln w="152400">
+          <a:ln w="254000">
             <a:solidFill>
               <a:srgbClr val="DE6800"/>
             </a:solidFill>
-            <a:prstDash val="dash"/>
+            <a:prstDash val="solid"/>
           </a:ln>
         </p:spPr>
         <p:style>
@@ -3280,19 +3280,75 @@
               </a:ext>
             </a:extLst>
           </p:cNvPr>
-          <p:cNvSpPr/>
+          <p:cNvSpPr>
+            <a:spLocks noChangeAspect="1"/>
+          </p:cNvSpPr>
           <p:nvPr/>
         </p:nvSpPr>
         <p:spPr>
           <a:xfrm>
-            <a:off x="6356813" y="4864012"/>
-            <a:ext cx="754553" cy="605481"/>
+            <a:off x="6499192" y="4463176"/>
+            <a:ext cx="1116000" cy="1115053"/>
           </a:xfrm>
           <a:prstGeom prst="triangle">
             <a:avLst/>
           </a:prstGeom>
           <a:solidFill>
             <a:srgbClr val="DE6800"/>
+          </a:solidFill>
+          <a:ln>
+            <a:noFill/>
+          </a:ln>
+        </p:spPr>
+        <p:style>
+          <a:lnRef idx="2">
+            <a:schemeClr val="accent1">
+              <a:shade val="15000"/>
+            </a:schemeClr>
+          </a:lnRef>
+          <a:fillRef idx="1">
+            <a:schemeClr val="accent1"/>
+          </a:fillRef>
+          <a:effectRef idx="0">
+            <a:schemeClr val="accent1"/>
+          </a:effectRef>
+          <a:fontRef idx="minor">
+            <a:schemeClr val="lt1"/>
+          </a:fontRef>
+        </p:style>
+        <p:txBody>
+          <a:bodyPr rtlCol="0" anchor="ctr"/>
+          <a:lstStyle/>
+          <a:p>
+            <a:pPr algn="ctr"/>
+            <a:endParaRPr lang="en-AU" dirty="0"/>
+          </a:p>
+        </p:txBody>
+      </p:sp>
+      <p:sp>
+        <p:nvSpPr>
+          <p:cNvPr id="2" name="Oval 1">
+            <a:extLst>
+              <a:ext uri="{FF2B5EF4-FFF2-40B4-BE49-F238E27FC236}">
+                <a16:creationId xmlns:a16="http://schemas.microsoft.com/office/drawing/2014/main" id="{E75030C8-8229-E90D-38C7-279278CE9693}"/>
+              </a:ext>
+            </a:extLst>
+          </p:cNvPr>
+          <p:cNvSpPr>
+            <a:spLocks noChangeAspect="1"/>
+          </p:cNvSpPr>
+          <p:nvPr/>
+        </p:nvSpPr>
+        <p:spPr>
+          <a:xfrm>
+            <a:off x="6499192" y="1051558"/>
+            <a:ext cx="1116000" cy="1116000"/>
+          </a:xfrm>
+          <a:prstGeom prst="ellipse">
+            <a:avLst/>
+          </a:prstGeom>
+          <a:solidFill>
+            <a:srgbClr val="C6C6C6"/>
           </a:solidFill>
           <a:ln>
             <a:noFill/>

</xml_diff>

<commit_message>
Figure Edits from CMG Email
Figure edits
</commit_message>
<xml_diff>
--- a/Final_figures/Legend.pptx
+++ b/Final_figures/Legend.pptx
@@ -244,7 +244,7 @@
           <a:p>
             <a:fld id="{C592C469-55FC-1C45-8992-CD041D69ECC4}" type="datetimeFigureOut">
               <a:rPr lang="en-AU" smtClean="0"/>
-              <a:t>20/7/2023</a:t>
+              <a:t>25/8/2023</a:t>
             </a:fld>
             <a:endParaRPr lang="en-AU"/>
           </a:p>
@@ -414,7 +414,7 @@
           <a:p>
             <a:fld id="{C592C469-55FC-1C45-8992-CD041D69ECC4}" type="datetimeFigureOut">
               <a:rPr lang="en-AU" smtClean="0"/>
-              <a:t>20/7/2023</a:t>
+              <a:t>25/8/2023</a:t>
             </a:fld>
             <a:endParaRPr lang="en-AU"/>
           </a:p>
@@ -594,7 +594,7 @@
           <a:p>
             <a:fld id="{C592C469-55FC-1C45-8992-CD041D69ECC4}" type="datetimeFigureOut">
               <a:rPr lang="en-AU" smtClean="0"/>
-              <a:t>20/7/2023</a:t>
+              <a:t>25/8/2023</a:t>
             </a:fld>
             <a:endParaRPr lang="en-AU"/>
           </a:p>
@@ -764,7 +764,7 @@
           <a:p>
             <a:fld id="{C592C469-55FC-1C45-8992-CD041D69ECC4}" type="datetimeFigureOut">
               <a:rPr lang="en-AU" smtClean="0"/>
-              <a:t>20/7/2023</a:t>
+              <a:t>25/8/2023</a:t>
             </a:fld>
             <a:endParaRPr lang="en-AU"/>
           </a:p>
@@ -1010,7 +1010,7 @@
           <a:p>
             <a:fld id="{C592C469-55FC-1C45-8992-CD041D69ECC4}" type="datetimeFigureOut">
               <a:rPr lang="en-AU" smtClean="0"/>
-              <a:t>20/7/2023</a:t>
+              <a:t>25/8/2023</a:t>
             </a:fld>
             <a:endParaRPr lang="en-AU"/>
           </a:p>
@@ -1242,7 +1242,7 @@
           <a:p>
             <a:fld id="{C592C469-55FC-1C45-8992-CD041D69ECC4}" type="datetimeFigureOut">
               <a:rPr lang="en-AU" smtClean="0"/>
-              <a:t>20/7/2023</a:t>
+              <a:t>25/8/2023</a:t>
             </a:fld>
             <a:endParaRPr lang="en-AU"/>
           </a:p>
@@ -1609,7 +1609,7 @@
           <a:p>
             <a:fld id="{C592C469-55FC-1C45-8992-CD041D69ECC4}" type="datetimeFigureOut">
               <a:rPr lang="en-AU" smtClean="0"/>
-              <a:t>20/7/2023</a:t>
+              <a:t>25/8/2023</a:t>
             </a:fld>
             <a:endParaRPr lang="en-AU"/>
           </a:p>
@@ -1727,7 +1727,7 @@
           <a:p>
             <a:fld id="{C592C469-55FC-1C45-8992-CD041D69ECC4}" type="datetimeFigureOut">
               <a:rPr lang="en-AU" smtClean="0"/>
-              <a:t>20/7/2023</a:t>
+              <a:t>25/8/2023</a:t>
             </a:fld>
             <a:endParaRPr lang="en-AU"/>
           </a:p>
@@ -1822,7 +1822,7 @@
           <a:p>
             <a:fld id="{C592C469-55FC-1C45-8992-CD041D69ECC4}" type="datetimeFigureOut">
               <a:rPr lang="en-AU" smtClean="0"/>
-              <a:t>20/7/2023</a:t>
+              <a:t>25/8/2023</a:t>
             </a:fld>
             <a:endParaRPr lang="en-AU"/>
           </a:p>
@@ -2099,7 +2099,7 @@
           <a:p>
             <a:fld id="{C592C469-55FC-1C45-8992-CD041D69ECC4}" type="datetimeFigureOut">
               <a:rPr lang="en-AU" smtClean="0"/>
-              <a:t>20/7/2023</a:t>
+              <a:t>25/8/2023</a:t>
             </a:fld>
             <a:endParaRPr lang="en-AU"/>
           </a:p>
@@ -2356,7 +2356,7 @@
           <a:p>
             <a:fld id="{C592C469-55FC-1C45-8992-CD041D69ECC4}" type="datetimeFigureOut">
               <a:rPr lang="en-AU" smtClean="0"/>
-              <a:t>20/7/2023</a:t>
+              <a:t>25/8/2023</a:t>
             </a:fld>
             <a:endParaRPr lang="en-AU"/>
           </a:p>
@@ -2569,7 +2569,7 @@
           <a:p>
             <a:fld id="{C592C469-55FC-1C45-8992-CD041D69ECC4}" type="datetimeFigureOut">
               <a:rPr lang="en-AU" smtClean="0"/>
-              <a:t>20/7/2023</a:t>
+              <a:t>25/8/2023</a:t>
             </a:fld>
             <a:endParaRPr lang="en-AU"/>
           </a:p>
@@ -2976,10 +2976,10 @@
       </p:grpSpPr>
       <p:grpSp>
         <p:nvGrpSpPr>
-          <p:cNvPr id="4" name="Group 3">
+          <p:cNvPr id="3" name="Group 2">
             <a:extLst>
               <a:ext uri="{FF2B5EF4-FFF2-40B4-BE49-F238E27FC236}">
-                <a16:creationId xmlns:a16="http://schemas.microsoft.com/office/drawing/2014/main" id="{85CC7F29-C4A9-DFC1-CEAB-576B494ECD7C}"/>
+                <a16:creationId xmlns:a16="http://schemas.microsoft.com/office/drawing/2014/main" id="{46876216-BC85-2A4D-643A-F0903704AF01}"/>
               </a:ext>
             </a:extLst>
           </p:cNvPr>
@@ -2988,18 +2988,211 @@
         </p:nvGrpSpPr>
         <p:grpSpPr>
           <a:xfrm>
-            <a:off x="1511626" y="160638"/>
-            <a:ext cx="6933884" cy="3517815"/>
-            <a:chOff x="2994224" y="1599308"/>
-            <a:chExt cx="695281" cy="317524"/>
+            <a:off x="1826803" y="743590"/>
+            <a:ext cx="6303531" cy="5551923"/>
+            <a:chOff x="1511626" y="160638"/>
+            <a:chExt cx="6933884" cy="6717827"/>
           </a:xfrm>
         </p:grpSpPr>
+        <p:grpSp>
+          <p:nvGrpSpPr>
+            <p:cNvPr id="4" name="Group 3">
+              <a:extLst>
+                <a:ext uri="{FF2B5EF4-FFF2-40B4-BE49-F238E27FC236}">
+                  <a16:creationId xmlns:a16="http://schemas.microsoft.com/office/drawing/2014/main" id="{85CC7F29-C4A9-DFC1-CEAB-576B494ECD7C}"/>
+                </a:ext>
+              </a:extLst>
+            </p:cNvPr>
+            <p:cNvGrpSpPr/>
+            <p:nvPr/>
+          </p:nvGrpSpPr>
+          <p:grpSpPr>
+            <a:xfrm>
+              <a:off x="1511626" y="160638"/>
+              <a:ext cx="6933884" cy="3517815"/>
+              <a:chOff x="2994224" y="1599308"/>
+              <a:chExt cx="695281" cy="317524"/>
+            </a:xfrm>
+          </p:grpSpPr>
+          <p:cxnSp>
+            <p:nvCxnSpPr>
+              <p:cNvPr id="5" name="Straight Connector 4">
+                <a:extLst>
+                  <a:ext uri="{FF2B5EF4-FFF2-40B4-BE49-F238E27FC236}">
+                    <a16:creationId xmlns:a16="http://schemas.microsoft.com/office/drawing/2014/main" id="{4172E62B-FA81-CF78-59D7-8CBE4DEAB5EB}"/>
+                  </a:ext>
+                </a:extLst>
+              </p:cNvPr>
+              <p:cNvCxnSpPr>
+                <a:cxnSpLocks/>
+              </p:cNvCxnSpPr>
+              <p:nvPr/>
+            </p:nvCxnSpPr>
+            <p:spPr>
+              <a:xfrm flipV="1">
+                <a:off x="3421948" y="1730090"/>
+                <a:ext cx="267557" cy="618"/>
+              </a:xfrm>
+              <a:prstGeom prst="line">
+                <a:avLst/>
+              </a:prstGeom>
+              <a:ln w="254000">
+                <a:solidFill>
+                  <a:srgbClr val="C6C6C6"/>
+                </a:solidFill>
+                <a:prstDash val="solid"/>
+              </a:ln>
+            </p:spPr>
+            <p:style>
+              <a:lnRef idx="1">
+                <a:schemeClr val="accent1"/>
+              </a:lnRef>
+              <a:fillRef idx="0">
+                <a:schemeClr val="accent1"/>
+              </a:fillRef>
+              <a:effectRef idx="0">
+                <a:schemeClr val="accent1"/>
+              </a:effectRef>
+              <a:fontRef idx="minor">
+                <a:schemeClr val="tx1"/>
+              </a:fontRef>
+            </p:style>
+          </p:cxnSp>
+          <p:grpSp>
+            <p:nvGrpSpPr>
+              <p:cNvPr id="6" name="Group 5">
+                <a:extLst>
+                  <a:ext uri="{FF2B5EF4-FFF2-40B4-BE49-F238E27FC236}">
+                    <a16:creationId xmlns:a16="http://schemas.microsoft.com/office/drawing/2014/main" id="{0D269846-5E1E-514D-ADD4-853A279EC02C}"/>
+                  </a:ext>
+                </a:extLst>
+              </p:cNvPr>
+              <p:cNvGrpSpPr/>
+              <p:nvPr/>
+            </p:nvGrpSpPr>
+            <p:grpSpPr>
+              <a:xfrm>
+                <a:off x="2994224" y="1599308"/>
+                <a:ext cx="339835" cy="317524"/>
+                <a:chOff x="8517956" y="5337025"/>
+                <a:chExt cx="339835" cy="317524"/>
+              </a:xfrm>
+            </p:grpSpPr>
+            <p:pic>
+              <p:nvPicPr>
+                <p:cNvPr id="7" name="Picture 8" descr="Insect Silhouette Tick Parasite Sketch Tick Stock Vector (Royalty Free)  1361079527 | Shutterstock">
+                  <a:extLst>
+                    <a:ext uri="{FF2B5EF4-FFF2-40B4-BE49-F238E27FC236}">
+                      <a16:creationId xmlns:a16="http://schemas.microsoft.com/office/drawing/2014/main" id="{BDED2FFE-C527-0D57-0432-547651BF947E}"/>
+                    </a:ext>
+                  </a:extLst>
+                </p:cNvPr>
+                <p:cNvPicPr>
+                  <a:picLocks noChangeAspect="1" noChangeArrowheads="1"/>
+                </p:cNvPicPr>
+                <p:nvPr/>
+              </p:nvPicPr>
+              <p:blipFill rotWithShape="1">
+                <a:blip r:embed="rId2">
+                  <a:extLst>
+                    <a:ext uri="{BEBA8EAE-BF5A-486C-A8C5-ECC9F3942E4B}">
+                      <a14:imgProps xmlns:a14="http://schemas.microsoft.com/office/drawing/2010/main">
+                        <a14:imgLayer r:embed="rId3">
+                          <a14:imgEffect>
+                            <a14:saturation sat="0"/>
+                          </a14:imgEffect>
+                        </a14:imgLayer>
+                      </a14:imgProps>
+                    </a:ext>
+                    <a:ext uri="{28A0092B-C50C-407E-A947-70E740481C1C}">
+                      <a14:useLocalDpi xmlns:a14="http://schemas.microsoft.com/office/drawing/2010/main" val="0"/>
+                    </a:ext>
+                  </a:extLst>
+                </a:blip>
+                <a:srcRect l="10685" t="14842" r="8384" b="14941"/>
+                <a:stretch/>
+              </p:blipFill>
+              <p:spPr bwMode="auto">
+                <a:xfrm>
+                  <a:off x="8517956" y="5337025"/>
+                  <a:ext cx="339835" cy="317524"/>
+                </a:xfrm>
+                <a:prstGeom prst="rect">
+                  <a:avLst/>
+                </a:prstGeom>
+                <a:solidFill>
+                  <a:srgbClr val="C6C6C6"/>
+                </a:solidFill>
+              </p:spPr>
+            </p:pic>
+            <p:sp>
+              <p:nvSpPr>
+                <p:cNvPr id="8" name="&quot;No&quot; Symbol 7">
+                  <a:extLst>
+                    <a:ext uri="{FF2B5EF4-FFF2-40B4-BE49-F238E27FC236}">
+                      <a16:creationId xmlns:a16="http://schemas.microsoft.com/office/drawing/2014/main" id="{EB792191-E092-8271-B488-876D4DE4E095}"/>
+                    </a:ext>
+                  </a:extLst>
+                </p:cNvPr>
+                <p:cNvSpPr/>
+                <p:nvPr/>
+              </p:nvSpPr>
+              <p:spPr>
+                <a:xfrm>
+                  <a:off x="8552806" y="5337025"/>
+                  <a:ext cx="270133" cy="265779"/>
+                </a:xfrm>
+                <a:prstGeom prst="noSmoking">
+                  <a:avLst>
+                    <a:gd name="adj" fmla="val 2095"/>
+                  </a:avLst>
+                </a:prstGeom>
+                <a:solidFill>
+                  <a:srgbClr val="C6C6C6"/>
+                </a:solidFill>
+                <a:ln>
+                  <a:solidFill>
+                    <a:srgbClr val="555555"/>
+                  </a:solidFill>
+                </a:ln>
+              </p:spPr>
+              <p:style>
+                <a:lnRef idx="2">
+                  <a:schemeClr val="accent1">
+                    <a:shade val="50000"/>
+                  </a:schemeClr>
+                </a:lnRef>
+                <a:fillRef idx="1">
+                  <a:schemeClr val="accent1"/>
+                </a:fillRef>
+                <a:effectRef idx="0">
+                  <a:schemeClr val="accent1"/>
+                </a:effectRef>
+                <a:fontRef idx="minor">
+                  <a:schemeClr val="lt1"/>
+                </a:fontRef>
+              </p:style>
+              <p:txBody>
+                <a:bodyPr rtlCol="0" anchor="ctr"/>
+                <a:lstStyle/>
+                <a:p>
+                  <a:pPr algn="ctr"/>
+                  <a:endParaRPr lang="en-AU" dirty="0">
+                    <a:solidFill>
+                      <a:schemeClr val="tx1"/>
+                    </a:solidFill>
+                  </a:endParaRPr>
+                </a:p>
+              </p:txBody>
+            </p:sp>
+          </p:grpSp>
+        </p:grpSp>
         <p:cxnSp>
           <p:nvCxnSpPr>
-            <p:cNvPr id="5" name="Straight Connector 4">
+            <p:cNvPr id="10" name="Straight Connector 9">
               <a:extLst>
                 <a:ext uri="{FF2B5EF4-FFF2-40B4-BE49-F238E27FC236}">
-                  <a16:creationId xmlns:a16="http://schemas.microsoft.com/office/drawing/2014/main" id="{4172E62B-FA81-CF78-59D7-8CBE4DEAB5EB}"/>
+                  <a16:creationId xmlns:a16="http://schemas.microsoft.com/office/drawing/2014/main" id="{160C88E2-04D0-CC46-C79C-304E56EE2622}"/>
                 </a:ext>
               </a:extLst>
             </p:cNvPr>
@@ -3010,15 +3203,15 @@
           </p:nvCxnSpPr>
           <p:spPr>
             <a:xfrm flipV="1">
-              <a:off x="3421948" y="1730090"/>
-              <a:ext cx="267557" cy="618"/>
+              <a:off x="5723050" y="5119558"/>
+              <a:ext cx="2668287" cy="6847"/>
             </a:xfrm>
             <a:prstGeom prst="line">
               <a:avLst/>
             </a:prstGeom>
             <a:ln w="254000">
               <a:solidFill>
-                <a:srgbClr val="C6C6C6"/>
+                <a:srgbClr val="DE6800"/>
               </a:solidFill>
               <a:prstDash val="solid"/>
             </a:ln>
@@ -3038,12 +3231,231 @@
             </a:fontRef>
           </p:style>
         </p:cxnSp>
+        <p:pic>
+          <p:nvPicPr>
+            <p:cNvPr id="11" name="Picture 8" descr="Insect Silhouette Tick Parasite Sketch Tick Stock Vector (Royalty Free)  1361079527 | Shutterstock">
+              <a:extLst>
+                <a:ext uri="{FF2B5EF4-FFF2-40B4-BE49-F238E27FC236}">
+                  <a16:creationId xmlns:a16="http://schemas.microsoft.com/office/drawing/2014/main" id="{F89A1F41-050B-27A6-110A-36FB1FE0F1DD}"/>
+                </a:ext>
+              </a:extLst>
+            </p:cNvPr>
+            <p:cNvPicPr>
+              <a:picLocks noChangeAspect="1" noChangeArrowheads="1"/>
+            </p:cNvPicPr>
+            <p:nvPr/>
+          </p:nvPicPr>
+          <p:blipFill rotWithShape="1">
+            <a:blip r:embed="rId4">
+              <a:duotone>
+                <a:schemeClr val="accent2">
+                  <a:shade val="45000"/>
+                  <a:satMod val="135000"/>
+                </a:schemeClr>
+                <a:prstClr val="white"/>
+              </a:duotone>
+              <a:extLst>
+                <a:ext uri="{BEBA8EAE-BF5A-486C-A8C5-ECC9F3942E4B}">
+                  <a14:imgProps xmlns:a14="http://schemas.microsoft.com/office/drawing/2010/main">
+                    <a14:imgLayer r:embed="rId5">
+                      <a14:imgEffect>
+                        <a14:artisticPhotocopy trans="22000"/>
+                      </a14:imgEffect>
+                      <a14:imgEffect>
+                        <a14:saturation sat="66000"/>
+                      </a14:imgEffect>
+                    </a14:imgLayer>
+                  </a14:imgProps>
+                </a:ext>
+                <a:ext uri="{28A0092B-C50C-407E-A947-70E740481C1C}">
+                  <a14:useLocalDpi xmlns:a14="http://schemas.microsoft.com/office/drawing/2010/main" val="0"/>
+                </a:ext>
+              </a:extLst>
+            </a:blip>
+            <a:srcRect l="10685" t="14842" r="8384" b="14941"/>
+            <a:stretch/>
+          </p:blipFill>
+          <p:spPr bwMode="auto">
+            <a:xfrm>
+              <a:off x="1511626" y="3360650"/>
+              <a:ext cx="3389099" cy="3517815"/>
+            </a:xfrm>
+            <a:prstGeom prst="rect">
+              <a:avLst/>
+            </a:prstGeom>
+            <a:solidFill>
+              <a:schemeClr val="tx1"/>
+            </a:solidFill>
+            <a:effectLst>
+              <a:softEdge rad="0"/>
+            </a:effectLst>
+          </p:spPr>
+        </p:pic>
+        <p:sp>
+          <p:nvSpPr>
+            <p:cNvPr id="13" name="Triangle 12">
+              <a:extLst>
+                <a:ext uri="{FF2B5EF4-FFF2-40B4-BE49-F238E27FC236}">
+                  <a16:creationId xmlns:a16="http://schemas.microsoft.com/office/drawing/2014/main" id="{BD8BE7B2-2E83-6BB9-1B5B-6E832B4C57C9}"/>
+                </a:ext>
+              </a:extLst>
+            </p:cNvPr>
+            <p:cNvSpPr>
+              <a:spLocks noChangeAspect="1"/>
+            </p:cNvSpPr>
+            <p:nvPr/>
+          </p:nvSpPr>
+          <p:spPr>
+            <a:xfrm>
+              <a:off x="6499192" y="4463176"/>
+              <a:ext cx="1116000" cy="1115053"/>
+            </a:xfrm>
+            <a:prstGeom prst="triangle">
+              <a:avLst/>
+            </a:prstGeom>
+            <a:solidFill>
+              <a:srgbClr val="DE6800"/>
+            </a:solidFill>
+            <a:ln>
+              <a:noFill/>
+            </a:ln>
+          </p:spPr>
+          <p:style>
+            <a:lnRef idx="2">
+              <a:schemeClr val="accent1">
+                <a:shade val="15000"/>
+              </a:schemeClr>
+            </a:lnRef>
+            <a:fillRef idx="1">
+              <a:schemeClr val="accent1"/>
+            </a:fillRef>
+            <a:effectRef idx="0">
+              <a:schemeClr val="accent1"/>
+            </a:effectRef>
+            <a:fontRef idx="minor">
+              <a:schemeClr val="lt1"/>
+            </a:fontRef>
+          </p:style>
+          <p:txBody>
+            <a:bodyPr rtlCol="0" anchor="ctr"/>
+            <a:lstStyle/>
+            <a:p>
+              <a:pPr algn="ctr"/>
+              <a:endParaRPr lang="en-AU" dirty="0"/>
+            </a:p>
+          </p:txBody>
+        </p:sp>
+        <p:sp>
+          <p:nvSpPr>
+            <p:cNvPr id="2" name="Oval 1">
+              <a:extLst>
+                <a:ext uri="{FF2B5EF4-FFF2-40B4-BE49-F238E27FC236}">
+                  <a16:creationId xmlns:a16="http://schemas.microsoft.com/office/drawing/2014/main" id="{E75030C8-8229-E90D-38C7-279278CE9693}"/>
+                </a:ext>
+              </a:extLst>
+            </p:cNvPr>
+            <p:cNvSpPr>
+              <a:spLocks noChangeAspect="1"/>
+            </p:cNvSpPr>
+            <p:nvPr/>
+          </p:nvSpPr>
+          <p:spPr>
+            <a:xfrm>
+              <a:off x="6499192" y="1051558"/>
+              <a:ext cx="1116000" cy="1116000"/>
+            </a:xfrm>
+            <a:prstGeom prst="ellipse">
+              <a:avLst/>
+            </a:prstGeom>
+            <a:solidFill>
+              <a:srgbClr val="C6C6C6"/>
+            </a:solidFill>
+            <a:ln>
+              <a:noFill/>
+            </a:ln>
+          </p:spPr>
+          <p:style>
+            <a:lnRef idx="2">
+              <a:schemeClr val="accent1">
+                <a:shade val="15000"/>
+              </a:schemeClr>
+            </a:lnRef>
+            <a:fillRef idx="1">
+              <a:schemeClr val="accent1"/>
+            </a:fillRef>
+            <a:effectRef idx="0">
+              <a:schemeClr val="accent1"/>
+            </a:effectRef>
+            <a:fontRef idx="minor">
+              <a:schemeClr val="lt1"/>
+            </a:fontRef>
+          </p:style>
+          <p:txBody>
+            <a:bodyPr rtlCol="0" anchor="ctr"/>
+            <a:lstStyle/>
+            <a:p>
+              <a:pPr algn="ctr"/>
+              <a:endParaRPr lang="en-AU" dirty="0"/>
+            </a:p>
+          </p:txBody>
+        </p:sp>
+      </p:grpSp>
+    </p:spTree>
+    <p:extLst>
+      <p:ext uri="{BB962C8B-B14F-4D97-AF65-F5344CB8AC3E}">
+        <p14:creationId xmlns:p14="http://schemas.microsoft.com/office/powerpoint/2010/main" val="2237359425"/>
+      </p:ext>
+    </p:extLst>
+  </p:cSld>
+  <p:clrMapOvr>
+    <a:masterClrMapping/>
+  </p:clrMapOvr>
+</p:sld>
+</file>
+
+<file path=ppt/slides/slide2.xml><?xml version="1.0" encoding="utf-8"?>
+<p:sld xmlns:a="http://schemas.openxmlformats.org/drawingml/2006/main" xmlns:r="http://schemas.openxmlformats.org/officeDocument/2006/relationships" xmlns:p="http://schemas.openxmlformats.org/presentationml/2006/main">
+  <p:cSld>
+    <p:spTree>
+      <p:nvGrpSpPr>
+        <p:cNvPr id="1" name=""/>
+        <p:cNvGrpSpPr/>
+        <p:nvPr/>
+      </p:nvGrpSpPr>
+      <p:grpSpPr>
+        <a:xfrm>
+          <a:off x="0" y="0"/>
+          <a:ext cx="0" cy="0"/>
+          <a:chOff x="0" y="0"/>
+          <a:chExt cx="0" cy="0"/>
+        </a:xfrm>
+      </p:grpSpPr>
+      <p:grpSp>
+        <p:nvGrpSpPr>
+          <p:cNvPr id="2" name="Group 1">
+            <a:extLst>
+              <a:ext uri="{FF2B5EF4-FFF2-40B4-BE49-F238E27FC236}">
+                <a16:creationId xmlns:a16="http://schemas.microsoft.com/office/drawing/2014/main" id="{E16EEA2F-05F5-2775-4FAC-294C87DD90F0}"/>
+              </a:ext>
+            </a:extLst>
+          </p:cNvPr>
+          <p:cNvGrpSpPr/>
+          <p:nvPr/>
+        </p:nvGrpSpPr>
+        <p:grpSpPr>
+          <a:xfrm>
+            <a:off x="2268124" y="1225368"/>
+            <a:ext cx="4570986" cy="4588366"/>
+            <a:chOff x="1511626" y="160638"/>
+            <a:chExt cx="6083982" cy="6717827"/>
+          </a:xfrm>
+        </p:grpSpPr>
         <p:grpSp>
           <p:nvGrpSpPr>
             <p:cNvPr id="6" name="Group 5">
               <a:extLst>
                 <a:ext uri="{FF2B5EF4-FFF2-40B4-BE49-F238E27FC236}">
-                  <a16:creationId xmlns:a16="http://schemas.microsoft.com/office/drawing/2014/main" id="{0D269846-5E1E-514D-ADD4-853A279EC02C}"/>
+                  <a16:creationId xmlns:a16="http://schemas.microsoft.com/office/drawing/2014/main" id="{544CAB24-B63D-6756-F7A0-209EBD22973D}"/>
                 </a:ext>
               </a:extLst>
             </p:cNvPr>
@@ -3052,8 +3464,8 @@
           </p:nvGrpSpPr>
           <p:grpSpPr>
             <a:xfrm>
-              <a:off x="2994224" y="1599308"/>
-              <a:ext cx="339835" cy="317524"/>
+              <a:off x="1511626" y="160638"/>
+              <a:ext cx="3389099" cy="3517815"/>
               <a:chOff x="8517956" y="5337025"/>
               <a:chExt cx="339835" cy="317524"/>
             </a:xfrm>
@@ -3063,7 +3475,7 @@
               <p:cNvPr id="7" name="Picture 8" descr="Insect Silhouette Tick Parasite Sketch Tick Stock Vector (Royalty Free)  1361079527 | Shutterstock">
                 <a:extLst>
                   <a:ext uri="{FF2B5EF4-FFF2-40B4-BE49-F238E27FC236}">
-                    <a16:creationId xmlns:a16="http://schemas.microsoft.com/office/drawing/2014/main" id="{BDED2FFE-C527-0D57-0432-547651BF947E}"/>
+                    <a16:creationId xmlns:a16="http://schemas.microsoft.com/office/drawing/2014/main" id="{A0322C36-F573-3818-3D6F-94EBEBC5B1FC}"/>
                   </a:ext>
                 </a:extLst>
               </p:cNvPr>
@@ -3110,7 +3522,7 @@
               <p:cNvPr id="8" name="&quot;No&quot; Symbol 7">
                 <a:extLst>
                   <a:ext uri="{FF2B5EF4-FFF2-40B4-BE49-F238E27FC236}">
-                    <a16:creationId xmlns:a16="http://schemas.microsoft.com/office/drawing/2014/main" id="{EB792191-E092-8271-B488-876D4DE4E095}"/>
+                    <a16:creationId xmlns:a16="http://schemas.microsoft.com/office/drawing/2014/main" id="{6BD617BA-BD66-4711-2AF1-ED9A3744DE31}"/>
                   </a:ext>
                 </a:extLst>
               </p:cNvPr>
@@ -3166,275 +3578,12 @@
             </p:txBody>
           </p:sp>
         </p:grpSp>
-      </p:grpSp>
-      <p:cxnSp>
-        <p:nvCxnSpPr>
-          <p:cNvPr id="10" name="Straight Connector 9">
-            <a:extLst>
-              <a:ext uri="{FF2B5EF4-FFF2-40B4-BE49-F238E27FC236}">
-                <a16:creationId xmlns:a16="http://schemas.microsoft.com/office/drawing/2014/main" id="{160C88E2-04D0-CC46-C79C-304E56EE2622}"/>
-              </a:ext>
-            </a:extLst>
-          </p:cNvPr>
-          <p:cNvCxnSpPr>
-            <a:cxnSpLocks/>
-          </p:cNvCxnSpPr>
-          <p:nvPr/>
-        </p:nvCxnSpPr>
-        <p:spPr>
-          <a:xfrm flipV="1">
-            <a:off x="5723050" y="5119558"/>
-            <a:ext cx="2668287" cy="6847"/>
-          </a:xfrm>
-          <a:prstGeom prst="line">
-            <a:avLst/>
-          </a:prstGeom>
-          <a:ln w="254000">
-            <a:solidFill>
-              <a:srgbClr val="DE6800"/>
-            </a:solidFill>
-            <a:prstDash val="solid"/>
-          </a:ln>
-        </p:spPr>
-        <p:style>
-          <a:lnRef idx="1">
-            <a:schemeClr val="accent1"/>
-          </a:lnRef>
-          <a:fillRef idx="0">
-            <a:schemeClr val="accent1"/>
-          </a:fillRef>
-          <a:effectRef idx="0">
-            <a:schemeClr val="accent1"/>
-          </a:effectRef>
-          <a:fontRef idx="minor">
-            <a:schemeClr val="tx1"/>
-          </a:fontRef>
-        </p:style>
-      </p:cxnSp>
-      <p:pic>
-        <p:nvPicPr>
-          <p:cNvPr id="11" name="Picture 8" descr="Insect Silhouette Tick Parasite Sketch Tick Stock Vector (Royalty Free)  1361079527 | Shutterstock">
-            <a:extLst>
-              <a:ext uri="{FF2B5EF4-FFF2-40B4-BE49-F238E27FC236}">
-                <a16:creationId xmlns:a16="http://schemas.microsoft.com/office/drawing/2014/main" id="{F89A1F41-050B-27A6-110A-36FB1FE0F1DD}"/>
-              </a:ext>
-            </a:extLst>
-          </p:cNvPr>
-          <p:cNvPicPr>
-            <a:picLocks noChangeAspect="1" noChangeArrowheads="1"/>
-          </p:cNvPicPr>
-          <p:nvPr/>
-        </p:nvPicPr>
-        <p:blipFill rotWithShape="1">
-          <a:blip r:embed="rId4">
-            <a:duotone>
-              <a:schemeClr val="accent2">
-                <a:shade val="45000"/>
-                <a:satMod val="135000"/>
-              </a:schemeClr>
-              <a:prstClr val="white"/>
-            </a:duotone>
-            <a:extLst>
-              <a:ext uri="{BEBA8EAE-BF5A-486C-A8C5-ECC9F3942E4B}">
-                <a14:imgProps xmlns:a14="http://schemas.microsoft.com/office/drawing/2010/main">
-                  <a14:imgLayer r:embed="rId5">
-                    <a14:imgEffect>
-                      <a14:artisticPhotocopy trans="22000"/>
-                    </a14:imgEffect>
-                    <a14:imgEffect>
-                      <a14:saturation sat="66000"/>
-                    </a14:imgEffect>
-                  </a14:imgLayer>
-                </a14:imgProps>
-              </a:ext>
-              <a:ext uri="{28A0092B-C50C-407E-A947-70E740481C1C}">
-                <a14:useLocalDpi xmlns:a14="http://schemas.microsoft.com/office/drawing/2010/main" val="0"/>
-              </a:ext>
-            </a:extLst>
-          </a:blip>
-          <a:srcRect l="10685" t="14842" r="8384" b="14941"/>
-          <a:stretch/>
-        </p:blipFill>
-        <p:spPr bwMode="auto">
-          <a:xfrm>
-            <a:off x="1511626" y="3360650"/>
-            <a:ext cx="3389099" cy="3517815"/>
-          </a:xfrm>
-          <a:prstGeom prst="rect">
-            <a:avLst/>
-          </a:prstGeom>
-          <a:solidFill>
-            <a:schemeClr val="tx1"/>
-          </a:solidFill>
-          <a:effectLst>
-            <a:softEdge rad="0"/>
-          </a:effectLst>
-        </p:spPr>
-      </p:pic>
-      <p:sp>
-        <p:nvSpPr>
-          <p:cNvPr id="13" name="Triangle 12">
-            <a:extLst>
-              <a:ext uri="{FF2B5EF4-FFF2-40B4-BE49-F238E27FC236}">
-                <a16:creationId xmlns:a16="http://schemas.microsoft.com/office/drawing/2014/main" id="{BD8BE7B2-2E83-6BB9-1B5B-6E832B4C57C9}"/>
-              </a:ext>
-            </a:extLst>
-          </p:cNvPr>
-          <p:cNvSpPr>
-            <a:spLocks noChangeAspect="1"/>
-          </p:cNvSpPr>
-          <p:nvPr/>
-        </p:nvSpPr>
-        <p:spPr>
-          <a:xfrm>
-            <a:off x="6499192" y="4463176"/>
-            <a:ext cx="1116000" cy="1115053"/>
-          </a:xfrm>
-          <a:prstGeom prst="triangle">
-            <a:avLst/>
-          </a:prstGeom>
-          <a:solidFill>
-            <a:srgbClr val="DE6800"/>
-          </a:solidFill>
-          <a:ln>
-            <a:noFill/>
-          </a:ln>
-        </p:spPr>
-        <p:style>
-          <a:lnRef idx="2">
-            <a:schemeClr val="accent1">
-              <a:shade val="15000"/>
-            </a:schemeClr>
-          </a:lnRef>
-          <a:fillRef idx="1">
-            <a:schemeClr val="accent1"/>
-          </a:fillRef>
-          <a:effectRef idx="0">
-            <a:schemeClr val="accent1"/>
-          </a:effectRef>
-          <a:fontRef idx="minor">
-            <a:schemeClr val="lt1"/>
-          </a:fontRef>
-        </p:style>
-        <p:txBody>
-          <a:bodyPr rtlCol="0" anchor="ctr"/>
-          <a:lstStyle/>
-          <a:p>
-            <a:pPr algn="ctr"/>
-            <a:endParaRPr lang="en-AU" dirty="0"/>
-          </a:p>
-        </p:txBody>
-      </p:sp>
-      <p:sp>
-        <p:nvSpPr>
-          <p:cNvPr id="2" name="Oval 1">
-            <a:extLst>
-              <a:ext uri="{FF2B5EF4-FFF2-40B4-BE49-F238E27FC236}">
-                <a16:creationId xmlns:a16="http://schemas.microsoft.com/office/drawing/2014/main" id="{E75030C8-8229-E90D-38C7-279278CE9693}"/>
-              </a:ext>
-            </a:extLst>
-          </p:cNvPr>
-          <p:cNvSpPr>
-            <a:spLocks noChangeAspect="1"/>
-          </p:cNvSpPr>
-          <p:nvPr/>
-        </p:nvSpPr>
-        <p:spPr>
-          <a:xfrm>
-            <a:off x="6499192" y="1051558"/>
-            <a:ext cx="1116000" cy="1116000"/>
-          </a:xfrm>
-          <a:prstGeom prst="ellipse">
-            <a:avLst/>
-          </a:prstGeom>
-          <a:solidFill>
-            <a:srgbClr val="C6C6C6"/>
-          </a:solidFill>
-          <a:ln>
-            <a:noFill/>
-          </a:ln>
-        </p:spPr>
-        <p:style>
-          <a:lnRef idx="2">
-            <a:schemeClr val="accent1">
-              <a:shade val="15000"/>
-            </a:schemeClr>
-          </a:lnRef>
-          <a:fillRef idx="1">
-            <a:schemeClr val="accent1"/>
-          </a:fillRef>
-          <a:effectRef idx="0">
-            <a:schemeClr val="accent1"/>
-          </a:effectRef>
-          <a:fontRef idx="minor">
-            <a:schemeClr val="lt1"/>
-          </a:fontRef>
-        </p:style>
-        <p:txBody>
-          <a:bodyPr rtlCol="0" anchor="ctr"/>
-          <a:lstStyle/>
-          <a:p>
-            <a:pPr algn="ctr"/>
-            <a:endParaRPr lang="en-AU" dirty="0"/>
-          </a:p>
-        </p:txBody>
-      </p:sp>
-    </p:spTree>
-    <p:extLst>
-      <p:ext uri="{BB962C8B-B14F-4D97-AF65-F5344CB8AC3E}">
-        <p14:creationId xmlns:p14="http://schemas.microsoft.com/office/powerpoint/2010/main" val="2237359425"/>
-      </p:ext>
-    </p:extLst>
-  </p:cSld>
-  <p:clrMapOvr>
-    <a:masterClrMapping/>
-  </p:clrMapOvr>
-</p:sld>
-</file>
-
-<file path=ppt/slides/slide2.xml><?xml version="1.0" encoding="utf-8"?>
-<p:sld xmlns:a="http://schemas.openxmlformats.org/drawingml/2006/main" xmlns:r="http://schemas.openxmlformats.org/officeDocument/2006/relationships" xmlns:p="http://schemas.openxmlformats.org/presentationml/2006/main">
-  <p:cSld>
-    <p:spTree>
-      <p:nvGrpSpPr>
-        <p:cNvPr id="1" name=""/>
-        <p:cNvGrpSpPr/>
-        <p:nvPr/>
-      </p:nvGrpSpPr>
-      <p:grpSpPr>
-        <a:xfrm>
-          <a:off x="0" y="0"/>
-          <a:ext cx="0" cy="0"/>
-          <a:chOff x="0" y="0"/>
-          <a:chExt cx="0" cy="0"/>
-        </a:xfrm>
-      </p:grpSpPr>
-      <p:grpSp>
-        <p:nvGrpSpPr>
-          <p:cNvPr id="6" name="Group 5">
-            <a:extLst>
-              <a:ext uri="{FF2B5EF4-FFF2-40B4-BE49-F238E27FC236}">
-                <a16:creationId xmlns:a16="http://schemas.microsoft.com/office/drawing/2014/main" id="{544CAB24-B63D-6756-F7A0-209EBD22973D}"/>
-              </a:ext>
-            </a:extLst>
-          </p:cNvPr>
-          <p:cNvGrpSpPr/>
-          <p:nvPr/>
-        </p:nvGrpSpPr>
-        <p:grpSpPr>
-          <a:xfrm>
-            <a:off x="1511626" y="160638"/>
-            <a:ext cx="3389099" cy="3517815"/>
-            <a:chOff x="8517956" y="5337025"/>
-            <a:chExt cx="339835" cy="317524"/>
-          </a:xfrm>
-        </p:grpSpPr>
         <p:pic>
           <p:nvPicPr>
-            <p:cNvPr id="7" name="Picture 8" descr="Insect Silhouette Tick Parasite Sketch Tick Stock Vector (Royalty Free)  1361079527 | Shutterstock">
+            <p:cNvPr id="10" name="Picture 8" descr="Insect Silhouette Tick Parasite Sketch Tick Stock Vector (Royalty Free)  1361079527 | Shutterstock">
               <a:extLst>
                 <a:ext uri="{FF2B5EF4-FFF2-40B4-BE49-F238E27FC236}">
-                  <a16:creationId xmlns:a16="http://schemas.microsoft.com/office/drawing/2014/main" id="{A0322C36-F573-3818-3D6F-94EBEBC5B1FC}"/>
+                  <a16:creationId xmlns:a16="http://schemas.microsoft.com/office/drawing/2014/main" id="{D60D8A52-BA0B-78FB-AE35-0054008238AD}"/>
                 </a:ext>
               </a:extLst>
             </p:cNvPr>
@@ -3444,13 +3593,23 @@
             <p:nvPr/>
           </p:nvPicPr>
           <p:blipFill rotWithShape="1">
-            <a:blip r:embed="rId2">
+            <a:blip r:embed="rId4">
+              <a:duotone>
+                <a:schemeClr val="accent2">
+                  <a:shade val="45000"/>
+                  <a:satMod val="135000"/>
+                </a:schemeClr>
+                <a:prstClr val="white"/>
+              </a:duotone>
               <a:extLst>
                 <a:ext uri="{BEBA8EAE-BF5A-486C-A8C5-ECC9F3942E4B}">
                   <a14:imgProps xmlns:a14="http://schemas.microsoft.com/office/drawing/2010/main">
-                    <a14:imgLayer r:embed="rId3">
+                    <a14:imgLayer r:embed="rId5">
                       <a14:imgEffect>
-                        <a14:saturation sat="0"/>
+                        <a14:artisticPhotocopy trans="22000"/>
+                      </a14:imgEffect>
+                      <a14:imgEffect>
+                        <a14:saturation sat="66000"/>
                       </a14:imgEffect>
                     </a14:imgLayer>
                   </a14:imgProps>
@@ -3465,52 +3624,57 @@
           </p:blipFill>
           <p:spPr bwMode="auto">
             <a:xfrm>
-              <a:off x="8517956" y="5337025"/>
-              <a:ext cx="339835" cy="317524"/>
+              <a:off x="1511626" y="3360650"/>
+              <a:ext cx="3389099" cy="3517815"/>
             </a:xfrm>
             <a:prstGeom prst="rect">
               <a:avLst/>
             </a:prstGeom>
             <a:solidFill>
-              <a:srgbClr val="C6C6C6"/>
+              <a:schemeClr val="tx1"/>
             </a:solidFill>
+            <a:effectLst>
+              <a:softEdge rad="0"/>
+            </a:effectLst>
           </p:spPr>
         </p:pic>
         <p:sp>
           <p:nvSpPr>
-            <p:cNvPr id="8" name="&quot;No&quot; Symbol 7">
+            <p:cNvPr id="12" name="Oval 11">
               <a:extLst>
                 <a:ext uri="{FF2B5EF4-FFF2-40B4-BE49-F238E27FC236}">
-                  <a16:creationId xmlns:a16="http://schemas.microsoft.com/office/drawing/2014/main" id="{6BD617BA-BD66-4711-2AF1-ED9A3744DE31}"/>
+                  <a16:creationId xmlns:a16="http://schemas.microsoft.com/office/drawing/2014/main" id="{50007186-D116-E71E-7EDB-5F5EADB5ECB1}"/>
                 </a:ext>
               </a:extLst>
             </p:cNvPr>
-            <p:cNvSpPr/>
+            <p:cNvSpPr>
+              <a:spLocks noChangeAspect="1"/>
+            </p:cNvSpPr>
             <p:nvPr/>
           </p:nvSpPr>
           <p:spPr>
             <a:xfrm>
-              <a:off x="8552806" y="5337025"/>
-              <a:ext cx="270133" cy="265779"/>
+              <a:off x="5615608" y="804278"/>
+              <a:ext cx="1980000" cy="1980000"/>
             </a:xfrm>
-            <a:prstGeom prst="noSmoking">
-              <a:avLst>
-                <a:gd name="adj" fmla="val 2095"/>
-              </a:avLst>
+            <a:prstGeom prst="ellipse">
+              <a:avLst/>
             </a:prstGeom>
             <a:solidFill>
               <a:srgbClr val="C6C6C6"/>
             </a:solidFill>
             <a:ln>
               <a:solidFill>
-                <a:srgbClr val="555555"/>
+                <a:schemeClr val="tx1">
+                  <a:lumMod val="50000"/>
+                </a:schemeClr>
               </a:solidFill>
             </a:ln>
           </p:spPr>
           <p:style>
             <a:lnRef idx="2">
               <a:schemeClr val="accent1">
-                <a:shade val="50000"/>
+                <a:shade val="15000"/>
               </a:schemeClr>
             </a:lnRef>
             <a:fillRef idx="1">
@@ -3528,191 +3692,69 @@
             <a:lstStyle/>
             <a:p>
               <a:pPr algn="ctr"/>
-              <a:endParaRPr lang="en-AU" dirty="0">
-                <a:solidFill>
-                  <a:schemeClr val="tx1"/>
-                </a:solidFill>
-              </a:endParaRPr>
+              <a:endParaRPr lang="en-AU" dirty="0"/>
+            </a:p>
+          </p:txBody>
+        </p:sp>
+        <p:sp>
+          <p:nvSpPr>
+            <p:cNvPr id="21" name="Oval 20">
+              <a:extLst>
+                <a:ext uri="{FF2B5EF4-FFF2-40B4-BE49-F238E27FC236}">
+                  <a16:creationId xmlns:a16="http://schemas.microsoft.com/office/drawing/2014/main" id="{97174D40-6F07-A955-3E02-E67B62DD3CB5}"/>
+                </a:ext>
+              </a:extLst>
+            </p:cNvPr>
+            <p:cNvSpPr>
+              <a:spLocks noChangeAspect="1"/>
+            </p:cNvSpPr>
+            <p:nvPr/>
+          </p:nvSpPr>
+          <p:spPr>
+            <a:xfrm>
+              <a:off x="5615608" y="4073723"/>
+              <a:ext cx="1980000" cy="1980000"/>
+            </a:xfrm>
+            <a:prstGeom prst="ellipse">
+              <a:avLst/>
+            </a:prstGeom>
+            <a:solidFill>
+              <a:srgbClr val="DE6800"/>
+            </a:solidFill>
+            <a:ln>
+              <a:solidFill>
+                <a:schemeClr val="tx1">
+                  <a:lumMod val="50000"/>
+                </a:schemeClr>
+              </a:solidFill>
+            </a:ln>
+          </p:spPr>
+          <p:style>
+            <a:lnRef idx="2">
+              <a:schemeClr val="accent1">
+                <a:shade val="15000"/>
+              </a:schemeClr>
+            </a:lnRef>
+            <a:fillRef idx="1">
+              <a:schemeClr val="accent1"/>
+            </a:fillRef>
+            <a:effectRef idx="0">
+              <a:schemeClr val="accent1"/>
+            </a:effectRef>
+            <a:fontRef idx="minor">
+              <a:schemeClr val="lt1"/>
+            </a:fontRef>
+          </p:style>
+          <p:txBody>
+            <a:bodyPr rtlCol="0" anchor="ctr"/>
+            <a:lstStyle/>
+            <a:p>
+              <a:pPr algn="ctr"/>
+              <a:endParaRPr lang="en-AU" dirty="0"/>
             </a:p>
           </p:txBody>
         </p:sp>
       </p:grpSp>
-      <p:pic>
-        <p:nvPicPr>
-          <p:cNvPr id="10" name="Picture 8" descr="Insect Silhouette Tick Parasite Sketch Tick Stock Vector (Royalty Free)  1361079527 | Shutterstock">
-            <a:extLst>
-              <a:ext uri="{FF2B5EF4-FFF2-40B4-BE49-F238E27FC236}">
-                <a16:creationId xmlns:a16="http://schemas.microsoft.com/office/drawing/2014/main" id="{D60D8A52-BA0B-78FB-AE35-0054008238AD}"/>
-              </a:ext>
-            </a:extLst>
-          </p:cNvPr>
-          <p:cNvPicPr>
-            <a:picLocks noChangeAspect="1" noChangeArrowheads="1"/>
-          </p:cNvPicPr>
-          <p:nvPr/>
-        </p:nvPicPr>
-        <p:blipFill rotWithShape="1">
-          <a:blip r:embed="rId4">
-            <a:duotone>
-              <a:schemeClr val="accent2">
-                <a:shade val="45000"/>
-                <a:satMod val="135000"/>
-              </a:schemeClr>
-              <a:prstClr val="white"/>
-            </a:duotone>
-            <a:extLst>
-              <a:ext uri="{BEBA8EAE-BF5A-486C-A8C5-ECC9F3942E4B}">
-                <a14:imgProps xmlns:a14="http://schemas.microsoft.com/office/drawing/2010/main">
-                  <a14:imgLayer r:embed="rId5">
-                    <a14:imgEffect>
-                      <a14:artisticPhotocopy trans="22000"/>
-                    </a14:imgEffect>
-                    <a14:imgEffect>
-                      <a14:saturation sat="66000"/>
-                    </a14:imgEffect>
-                  </a14:imgLayer>
-                </a14:imgProps>
-              </a:ext>
-              <a:ext uri="{28A0092B-C50C-407E-A947-70E740481C1C}">
-                <a14:useLocalDpi xmlns:a14="http://schemas.microsoft.com/office/drawing/2010/main" val="0"/>
-              </a:ext>
-            </a:extLst>
-          </a:blip>
-          <a:srcRect l="10685" t="14842" r="8384" b="14941"/>
-          <a:stretch/>
-        </p:blipFill>
-        <p:spPr bwMode="auto">
-          <a:xfrm>
-            <a:off x="1511626" y="3360650"/>
-            <a:ext cx="3389099" cy="3517815"/>
-          </a:xfrm>
-          <a:prstGeom prst="rect">
-            <a:avLst/>
-          </a:prstGeom>
-          <a:solidFill>
-            <a:schemeClr val="tx1"/>
-          </a:solidFill>
-          <a:effectLst>
-            <a:softEdge rad="0"/>
-          </a:effectLst>
-        </p:spPr>
-      </p:pic>
-      <p:sp>
-        <p:nvSpPr>
-          <p:cNvPr id="12" name="Oval 11">
-            <a:extLst>
-              <a:ext uri="{FF2B5EF4-FFF2-40B4-BE49-F238E27FC236}">
-                <a16:creationId xmlns:a16="http://schemas.microsoft.com/office/drawing/2014/main" id="{50007186-D116-E71E-7EDB-5F5EADB5ECB1}"/>
-              </a:ext>
-            </a:extLst>
-          </p:cNvPr>
-          <p:cNvSpPr>
-            <a:spLocks noChangeAspect="1"/>
-          </p:cNvSpPr>
-          <p:nvPr/>
-        </p:nvSpPr>
-        <p:spPr>
-          <a:xfrm>
-            <a:off x="5615608" y="804278"/>
-            <a:ext cx="1980000" cy="1980000"/>
-          </a:xfrm>
-          <a:prstGeom prst="ellipse">
-            <a:avLst/>
-          </a:prstGeom>
-          <a:solidFill>
-            <a:srgbClr val="C6C6C6"/>
-          </a:solidFill>
-          <a:ln>
-            <a:solidFill>
-              <a:schemeClr val="tx1">
-                <a:lumMod val="50000"/>
-              </a:schemeClr>
-            </a:solidFill>
-          </a:ln>
-        </p:spPr>
-        <p:style>
-          <a:lnRef idx="2">
-            <a:schemeClr val="accent1">
-              <a:shade val="15000"/>
-            </a:schemeClr>
-          </a:lnRef>
-          <a:fillRef idx="1">
-            <a:schemeClr val="accent1"/>
-          </a:fillRef>
-          <a:effectRef idx="0">
-            <a:schemeClr val="accent1"/>
-          </a:effectRef>
-          <a:fontRef idx="minor">
-            <a:schemeClr val="lt1"/>
-          </a:fontRef>
-        </p:style>
-        <p:txBody>
-          <a:bodyPr rtlCol="0" anchor="ctr"/>
-          <a:lstStyle/>
-          <a:p>
-            <a:pPr algn="ctr"/>
-            <a:endParaRPr lang="en-AU" dirty="0"/>
-          </a:p>
-        </p:txBody>
-      </p:sp>
-      <p:sp>
-        <p:nvSpPr>
-          <p:cNvPr id="21" name="Oval 20">
-            <a:extLst>
-              <a:ext uri="{FF2B5EF4-FFF2-40B4-BE49-F238E27FC236}">
-                <a16:creationId xmlns:a16="http://schemas.microsoft.com/office/drawing/2014/main" id="{97174D40-6F07-A955-3E02-E67B62DD3CB5}"/>
-              </a:ext>
-            </a:extLst>
-          </p:cNvPr>
-          <p:cNvSpPr>
-            <a:spLocks noChangeAspect="1"/>
-          </p:cNvSpPr>
-          <p:nvPr/>
-        </p:nvSpPr>
-        <p:spPr>
-          <a:xfrm>
-            <a:off x="5615608" y="4073723"/>
-            <a:ext cx="1980000" cy="1980000"/>
-          </a:xfrm>
-          <a:prstGeom prst="ellipse">
-            <a:avLst/>
-          </a:prstGeom>
-          <a:solidFill>
-            <a:srgbClr val="DE6800"/>
-          </a:solidFill>
-          <a:ln>
-            <a:solidFill>
-              <a:schemeClr val="tx1">
-                <a:lumMod val="50000"/>
-              </a:schemeClr>
-            </a:solidFill>
-          </a:ln>
-        </p:spPr>
-        <p:style>
-          <a:lnRef idx="2">
-            <a:schemeClr val="accent1">
-              <a:shade val="15000"/>
-            </a:schemeClr>
-          </a:lnRef>
-          <a:fillRef idx="1">
-            <a:schemeClr val="accent1"/>
-          </a:fillRef>
-          <a:effectRef idx="0">
-            <a:schemeClr val="accent1"/>
-          </a:effectRef>
-          <a:fontRef idx="minor">
-            <a:schemeClr val="lt1"/>
-          </a:fontRef>
-        </p:style>
-        <p:txBody>
-          <a:bodyPr rtlCol="0" anchor="ctr"/>
-          <a:lstStyle/>
-          <a:p>
-            <a:pPr algn="ctr"/>
-            <a:endParaRPr lang="en-AU" dirty="0"/>
-          </a:p>
-        </p:txBody>
-      </p:sp>
     </p:spTree>
     <p:extLst>
       <p:ext uri="{BB962C8B-B14F-4D97-AF65-F5344CB8AC3E}">

</xml_diff>